<commit_message>
Mise à jour de rapport Mise à jour de présentation
</commit_message>
<xml_diff>
--- a/SYSTÈME DE PILOTE DE BARRE.pptx
+++ b/SYSTÈME DE PILOTE DE BARRE.pptx
@@ -11,9 +11,11 @@
     <p:sldId id="259" r:id="rId5"/>
     <p:sldId id="260" r:id="rId6"/>
     <p:sldId id="261" r:id="rId7"/>
-    <p:sldId id="262" r:id="rId8"/>
-    <p:sldId id="264" r:id="rId9"/>
-    <p:sldId id="263" r:id="rId10"/>
+    <p:sldId id="265" r:id="rId8"/>
+    <p:sldId id="267" r:id="rId9"/>
+    <p:sldId id="262" r:id="rId10"/>
+    <p:sldId id="264" r:id="rId11"/>
+    <p:sldId id="263" r:id="rId12"/>
   </p:sldIdLst>
   <p:sldSz cx="12192000" cy="6858000"/>
   <p:notesSz cx="6858000" cy="9144000"/>
@@ -112,6 +114,11 @@
       </a:defRPr>
     </a:lvl9pPr>
   </p:defaultTextStyle>
+  <p:extLst>
+    <p:ext uri="{EFAFB233-063F-42B5-8137-9DF3F51BA10A}">
+      <p15:sldGuideLst xmlns:p15="http://schemas.microsoft.com/office/powerpoint/2012/main"/>
+    </p:ext>
+  </p:extLst>
 </p:presentation>
 </file>
 
@@ -332,7 +339,7 @@
           <a:p>
             <a:fld id="{9AB3A824-1A51-4B26-AD58-A6D8E14F6C04}" type="datetimeFigureOut">
               <a:rPr lang="en-US" dirty="0"/>
-              <a:t>11/5/2023</a:t>
+              <a:t>11/12/2023</a:t>
             </a:fld>
             <a:endParaRPr lang="en-US" dirty="0"/>
           </a:p>
@@ -666,7 +673,7 @@
           <a:p>
             <a:fld id="{D857E33E-8B18-4087-B112-809917729534}" type="datetimeFigureOut">
               <a:rPr lang="en-US" dirty="0"/>
-              <a:t>11/5/2023</a:t>
+              <a:t>11/12/2023</a:t>
             </a:fld>
             <a:endParaRPr lang="en-US" dirty="0"/>
           </a:p>
@@ -968,7 +975,7 @@
           <a:p>
             <a:fld id="{D3FFE419-2371-464F-8239-3959401C3561}" type="datetimeFigureOut">
               <a:rPr lang="en-US" dirty="0"/>
-              <a:t>11/5/2023</a:t>
+              <a:t>11/12/2023</a:t>
             </a:fld>
             <a:endParaRPr lang="en-US" dirty="0"/>
           </a:p>
@@ -1215,7 +1222,7 @@
           <a:p>
             <a:fld id="{97D162C4-EDD9-4389-A98B-B87ECEA2A816}" type="datetimeFigureOut">
               <a:rPr lang="en-US" dirty="0"/>
-              <a:t>11/5/2023</a:t>
+              <a:t>11/12/2023</a:t>
             </a:fld>
             <a:endParaRPr lang="en-US" dirty="0"/>
           </a:p>
@@ -1622,7 +1629,7 @@
           <a:p>
             <a:fld id="{3E5059C3-6A89-4494-99FF-5A4D6FFD50EB}" type="datetimeFigureOut">
               <a:rPr lang="en-US" dirty="0"/>
-              <a:t>11/5/2023</a:t>
+              <a:t>11/12/2023</a:t>
             </a:fld>
             <a:endParaRPr lang="en-US" dirty="0"/>
           </a:p>
@@ -1936,7 +1943,7 @@
           <a:p>
             <a:fld id="{CA954B2F-12DE-47F5-8894-472B206D2E1E}" type="datetimeFigureOut">
               <a:rPr lang="en-US" dirty="0"/>
-              <a:t>11/5/2023</a:t>
+              <a:t>11/12/2023</a:t>
             </a:fld>
             <a:endParaRPr lang="en-US" dirty="0"/>
           </a:p>
@@ -2480,7 +2487,7 @@
           <a:p>
             <a:fld id="{3F30E46F-7819-4ACF-B48B-48222C2ACC88}" type="datetimeFigureOut">
               <a:rPr lang="en-US" dirty="0"/>
-              <a:t>11/5/2023</a:t>
+              <a:t>11/12/2023</a:t>
             </a:fld>
             <a:endParaRPr lang="en-US" dirty="0"/>
           </a:p>
@@ -2675,7 +2682,7 @@
           <a:p>
             <a:fld id="{1FAF3416-4057-4DAA-829D-4CA07428D088}" type="datetimeFigureOut">
               <a:rPr lang="en-US" dirty="0"/>
-              <a:t>11/5/2023</a:t>
+              <a:t>11/12/2023</a:t>
             </a:fld>
             <a:endParaRPr lang="en-US" dirty="0"/>
           </a:p>
@@ -2888,7 +2895,7 @@
           <a:p>
             <a:fld id="{921D9284-D300-4297-87F7-E791DCC15DB1}" type="datetimeFigureOut">
               <a:rPr lang="en-US" dirty="0"/>
-              <a:t>11/5/2023</a:t>
+              <a:t>11/12/2023</a:t>
             </a:fld>
             <a:endParaRPr lang="en-US" dirty="0"/>
           </a:p>
@@ -3257,7 +3264,7 @@
           <a:p>
             <a:fld id="{37D525BB-DA17-4BA0-B3C8-3AC3ABC827E6}" type="datetimeFigureOut">
               <a:rPr lang="en-US" dirty="0"/>
-              <a:t>11/5/2023</a:t>
+              <a:t>11/12/2023</a:t>
             </a:fld>
             <a:endParaRPr lang="en-US" dirty="0"/>
           </a:p>
@@ -3660,7 +3667,7 @@
           <a:p>
             <a:fld id="{B16C4C9A-3960-41CF-A4E9-2A8FB932454B}" type="datetimeFigureOut">
               <a:rPr lang="en-US" dirty="0"/>
-              <a:t>11/5/2023</a:t>
+              <a:t>11/12/2023</a:t>
             </a:fld>
             <a:endParaRPr lang="en-US" dirty="0"/>
           </a:p>
@@ -3971,7 +3978,7 @@
           <a:p>
             <a:fld id="{3CBC1C18-307B-4F68-A007-B5B542270E8D}" type="datetimeFigureOut">
               <a:rPr lang="en-US" dirty="0"/>
-              <a:t>11/5/2023</a:t>
+              <a:t>11/12/2023</a:t>
             </a:fld>
             <a:endParaRPr lang="en-US" dirty="0"/>
           </a:p>
@@ -4785,6 +4792,509 @@
 </p:sld>
 </file>
 
+<file path=ppt/slides/slide10.xml><?xml version="1.0" encoding="utf-8"?>
+<p:sld xmlns:a="http://schemas.openxmlformats.org/drawingml/2006/main" xmlns:r="http://schemas.openxmlformats.org/officeDocument/2006/relationships" xmlns:p="http://schemas.openxmlformats.org/presentationml/2006/main">
+  <p:cSld>
+    <p:spTree>
+      <p:nvGrpSpPr>
+        <p:cNvPr id="1" name=""/>
+        <p:cNvGrpSpPr/>
+        <p:nvPr/>
+      </p:nvGrpSpPr>
+      <p:grpSpPr>
+        <a:xfrm>
+          <a:off x="0" y="0"/>
+          <a:ext cx="0" cy="0"/>
+          <a:chOff x="0" y="0"/>
+          <a:chExt cx="0" cy="0"/>
+        </a:xfrm>
+      </p:grpSpPr>
+      <p:sp>
+        <p:nvSpPr>
+          <p:cNvPr id="4" name="Título 1">
+            <a:extLst>
+              <a:ext uri="{FF2B5EF4-FFF2-40B4-BE49-F238E27FC236}">
+                <a16:creationId xmlns:a16="http://schemas.microsoft.com/office/drawing/2014/main" id="{585AD0D3-6A3C-4BF9-AF7B-CA29E6B2DED2}"/>
+              </a:ext>
+            </a:extLst>
+          </p:cNvPr>
+          <p:cNvSpPr txBox="1">
+            <a:spLocks/>
+          </p:cNvSpPr>
+          <p:nvPr/>
+        </p:nvSpPr>
+        <p:spPr>
+          <a:xfrm>
+            <a:off x="4157054" y="134957"/>
+            <a:ext cx="3877892" cy="550844"/>
+          </a:xfrm>
+          <a:prstGeom prst="rect">
+            <a:avLst/>
+          </a:prstGeom>
+        </p:spPr>
+        <p:txBody>
+          <a:bodyPr vert="horz" lIns="91440" tIns="45720" rIns="91440" bIns="45720" rtlCol="0" anchor="t">
+            <a:normAutofit fontScale="82500" lnSpcReduction="10000"/>
+          </a:bodyPr>
+          <a:lstStyle>
+            <a:lvl1pPr algn="r" defTabSz="914400" rtl="0" eaLnBrk="1" latinLnBrk="0" hangingPunct="1">
+              <a:lnSpc>
+                <a:spcPct val="90000"/>
+              </a:lnSpc>
+              <a:spcBef>
+                <a:spcPct val="0"/>
+              </a:spcBef>
+              <a:buNone/>
+              <a:defRPr sz="3400" b="0" i="0" kern="1200" cap="none">
+                <a:solidFill>
+                  <a:schemeClr val="tx1"/>
+                </a:solidFill>
+                <a:effectLst/>
+                <a:latin typeface="+mj-lt"/>
+                <a:ea typeface="+mj-ea"/>
+                <a:cs typeface="+mj-cs"/>
+              </a:defRPr>
+            </a:lvl1pPr>
+          </a:lstStyle>
+          <a:p>
+            <a:pPr algn="ctr"/>
+            <a:r>
+              <a:rPr lang="es-ES" b="1" dirty="0"/>
+              <a:t>GESTION DE VERIN</a:t>
+            </a:r>
+          </a:p>
+        </p:txBody>
+      </p:sp>
+      <p:sp>
+        <p:nvSpPr>
+          <p:cNvPr id="5" name="CuadroTexto 4">
+            <a:extLst>
+              <a:ext uri="{FF2B5EF4-FFF2-40B4-BE49-F238E27FC236}">
+                <a16:creationId xmlns:a16="http://schemas.microsoft.com/office/drawing/2014/main" id="{6E315DB0-FB58-4DEA-B041-55D3D36CE296}"/>
+              </a:ext>
+            </a:extLst>
+          </p:cNvPr>
+          <p:cNvSpPr txBox="1"/>
+          <p:nvPr/>
+        </p:nvSpPr>
+        <p:spPr>
+          <a:xfrm>
+            <a:off x="1079500" y="685801"/>
+            <a:ext cx="10134600" cy="923330"/>
+          </a:xfrm>
+          <a:prstGeom prst="rect">
+            <a:avLst/>
+          </a:prstGeom>
+          <a:noFill/>
+        </p:spPr>
+        <p:txBody>
+          <a:bodyPr wrap="square" rtlCol="0">
+            <a:spAutoFit/>
+          </a:bodyPr>
+          <a:lstStyle/>
+          <a:p>
+            <a:pPr algn="just"/>
+            <a:r>
+              <a:rPr lang="es-ES" dirty="0" err="1"/>
+              <a:t>Après</a:t>
+            </a:r>
+            <a:r>
+              <a:rPr lang="es-ES" dirty="0"/>
+              <a:t> </a:t>
+            </a:r>
+            <a:r>
+              <a:rPr lang="es-ES" dirty="0" err="1"/>
+              <a:t>tous</a:t>
+            </a:r>
+            <a:r>
+              <a:rPr lang="es-ES" dirty="0"/>
+              <a:t> ces </a:t>
+            </a:r>
+            <a:r>
+              <a:rPr lang="es-ES" dirty="0" err="1"/>
+              <a:t>étapes</a:t>
+            </a:r>
+            <a:r>
+              <a:rPr lang="es-ES" dirty="0"/>
+              <a:t> et </a:t>
+            </a:r>
+            <a:r>
+              <a:rPr lang="es-ES" dirty="0" err="1"/>
+              <a:t>qu’on</a:t>
+            </a:r>
+            <a:r>
+              <a:rPr lang="es-ES" dirty="0"/>
+              <a:t> </a:t>
+            </a:r>
+            <a:r>
+              <a:rPr lang="es-ES" dirty="0" err="1"/>
+              <a:t>est</a:t>
+            </a:r>
+            <a:r>
+              <a:rPr lang="es-ES" dirty="0"/>
+              <a:t> </a:t>
+            </a:r>
+            <a:r>
+              <a:rPr lang="es-ES" dirty="0" err="1"/>
+              <a:t>sûre</a:t>
+            </a:r>
+            <a:r>
+              <a:rPr lang="es-ES" dirty="0"/>
+              <a:t> que les </a:t>
+            </a:r>
+            <a:r>
+              <a:rPr lang="es-ES" dirty="0" err="1"/>
+              <a:t>fonctions</a:t>
+            </a:r>
+            <a:r>
+              <a:rPr lang="es-ES" dirty="0"/>
+              <a:t> </a:t>
+            </a:r>
+            <a:r>
+              <a:rPr lang="es-ES" dirty="0" err="1"/>
+              <a:t>marchent</a:t>
+            </a:r>
+            <a:r>
+              <a:rPr lang="es-ES" dirty="0"/>
+              <a:t> </a:t>
+            </a:r>
+            <a:r>
+              <a:rPr lang="es-ES" dirty="0" err="1"/>
+              <a:t>comme</a:t>
+            </a:r>
+            <a:r>
+              <a:rPr lang="es-ES" dirty="0"/>
+              <a:t> </a:t>
+            </a:r>
+            <a:r>
+              <a:rPr lang="es-ES" dirty="0" err="1"/>
+              <a:t>il</a:t>
+            </a:r>
+            <a:r>
+              <a:rPr lang="es-ES" dirty="0"/>
+              <a:t> </a:t>
+            </a:r>
+            <a:r>
+              <a:rPr lang="es-ES" dirty="0" err="1"/>
+              <a:t>faut</a:t>
+            </a:r>
+            <a:r>
+              <a:rPr lang="es-ES" dirty="0"/>
+              <a:t>, </a:t>
+            </a:r>
+            <a:r>
+              <a:rPr lang="es-ES" dirty="0" err="1"/>
+              <a:t>on</a:t>
+            </a:r>
+            <a:r>
+              <a:rPr lang="es-ES" dirty="0"/>
+              <a:t> </a:t>
+            </a:r>
+            <a:r>
+              <a:rPr lang="es-ES" dirty="0" err="1"/>
+              <a:t>passe</a:t>
+            </a:r>
+            <a:r>
+              <a:rPr lang="es-ES" dirty="0"/>
+              <a:t> </a:t>
+            </a:r>
+            <a:r>
+              <a:rPr lang="es-ES" dirty="0" err="1"/>
+              <a:t>au</a:t>
+            </a:r>
+            <a:r>
+              <a:rPr lang="es-ES" dirty="0"/>
+              <a:t> test </a:t>
+            </a:r>
+            <a:r>
+              <a:rPr lang="es-ES" dirty="0" err="1"/>
+              <a:t>réel</a:t>
+            </a:r>
+            <a:r>
+              <a:rPr lang="es-ES" dirty="0"/>
+              <a:t> de </a:t>
+            </a:r>
+            <a:r>
+              <a:rPr lang="es-ES" dirty="0" err="1"/>
+              <a:t>notre</a:t>
+            </a:r>
+            <a:r>
+              <a:rPr lang="es-ES" dirty="0"/>
+              <a:t> </a:t>
+            </a:r>
+            <a:r>
+              <a:rPr lang="es-ES" dirty="0" err="1"/>
+              <a:t>système</a:t>
+            </a:r>
+            <a:r>
+              <a:rPr lang="es-ES" dirty="0"/>
+              <a:t> en </a:t>
+            </a:r>
+            <a:r>
+              <a:rPr lang="es-ES" dirty="0" err="1"/>
+              <a:t>utilisant</a:t>
+            </a:r>
+            <a:r>
+              <a:rPr lang="es-ES" dirty="0"/>
+              <a:t> le </a:t>
+            </a:r>
+            <a:r>
+              <a:rPr lang="es-ES" dirty="0" err="1"/>
+              <a:t>verin</a:t>
+            </a:r>
+            <a:r>
+              <a:rPr lang="es-ES" dirty="0"/>
+              <a:t> qui </a:t>
+            </a:r>
+            <a:r>
+              <a:rPr lang="es-ES" dirty="0" err="1"/>
+              <a:t>traduit</a:t>
+            </a:r>
+            <a:r>
+              <a:rPr lang="es-ES" dirty="0"/>
+              <a:t> le </a:t>
+            </a:r>
+            <a:r>
+              <a:rPr lang="es-ES" dirty="0" err="1"/>
+              <a:t>comportement</a:t>
+            </a:r>
+            <a:r>
+              <a:rPr lang="es-ES" dirty="0"/>
+              <a:t> de </a:t>
+            </a:r>
+            <a:r>
+              <a:rPr lang="es-ES" dirty="0" err="1"/>
+              <a:t>système</a:t>
+            </a:r>
+            <a:r>
+              <a:rPr lang="es-ES" dirty="0"/>
+              <a:t> de </a:t>
+            </a:r>
+            <a:r>
+              <a:rPr lang="es-ES" dirty="0" err="1"/>
+              <a:t>contrôle</a:t>
+            </a:r>
+            <a:r>
+              <a:rPr lang="es-ES" dirty="0"/>
+              <a:t> de </a:t>
+            </a:r>
+            <a:r>
+              <a:rPr lang="es-ES" dirty="0" err="1"/>
+              <a:t>voilier</a:t>
+            </a:r>
+            <a:r>
+              <a:rPr lang="es-ES" dirty="0"/>
+              <a:t> en </a:t>
+            </a:r>
+            <a:r>
+              <a:rPr lang="es-ES" dirty="0" err="1"/>
+              <a:t>fonction</a:t>
+            </a:r>
+            <a:r>
+              <a:rPr lang="es-ES" dirty="0"/>
+              <a:t> des </a:t>
+            </a:r>
+            <a:r>
+              <a:rPr lang="es-ES" dirty="0" err="1"/>
+              <a:t>données</a:t>
+            </a:r>
+            <a:r>
+              <a:rPr lang="es-ES" dirty="0"/>
+              <a:t> de compas et de </a:t>
+            </a:r>
+            <a:r>
+              <a:rPr lang="es-ES" dirty="0" err="1"/>
+              <a:t>l’anémomètre</a:t>
+            </a:r>
+            <a:r>
+              <a:rPr lang="es-ES" dirty="0"/>
+              <a:t> </a:t>
+            </a:r>
+            <a:r>
+              <a:rPr lang="es-ES" dirty="0" err="1"/>
+              <a:t>pour</a:t>
+            </a:r>
+            <a:r>
+              <a:rPr lang="es-ES" dirty="0"/>
+              <a:t> </a:t>
+            </a:r>
+            <a:r>
+              <a:rPr lang="es-ES" dirty="0" err="1"/>
+              <a:t>finaliser</a:t>
+            </a:r>
+            <a:r>
+              <a:rPr lang="es-ES" dirty="0"/>
+              <a:t> le </a:t>
+            </a:r>
+            <a:r>
+              <a:rPr lang="es-ES" dirty="0" err="1"/>
+              <a:t>projet</a:t>
+            </a:r>
+            <a:r>
+              <a:rPr lang="es-ES" dirty="0"/>
+              <a:t> :</a:t>
+            </a:r>
+          </a:p>
+        </p:txBody>
+      </p:sp>
+      <p:pic>
+        <p:nvPicPr>
+          <p:cNvPr id="3" name="Imagen 2">
+            <a:extLst>
+              <a:ext uri="{FF2B5EF4-FFF2-40B4-BE49-F238E27FC236}">
+                <a16:creationId xmlns:a16="http://schemas.microsoft.com/office/drawing/2014/main" id="{2BECB17C-E274-4792-913D-CE07531607CE}"/>
+              </a:ext>
+            </a:extLst>
+          </p:cNvPr>
+          <p:cNvPicPr>
+            <a:picLocks noChangeAspect="1"/>
+          </p:cNvPicPr>
+          <p:nvPr/>
+        </p:nvPicPr>
+        <p:blipFill>
+          <a:blip r:embed="rId2"/>
+          <a:stretch>
+            <a:fillRect/>
+          </a:stretch>
+        </p:blipFill>
+        <p:spPr>
+          <a:xfrm>
+            <a:off x="1709737" y="1741487"/>
+            <a:ext cx="8772525" cy="4848225"/>
+          </a:xfrm>
+          <a:prstGeom prst="rect">
+            <a:avLst/>
+          </a:prstGeom>
+        </p:spPr>
+      </p:pic>
+    </p:spTree>
+    <p:extLst>
+      <p:ext uri="{BB962C8B-B14F-4D97-AF65-F5344CB8AC3E}">
+        <p14:creationId xmlns:p14="http://schemas.microsoft.com/office/powerpoint/2010/main" val="2110897045"/>
+      </p:ext>
+    </p:extLst>
+  </p:cSld>
+  <p:clrMapOvr>
+    <a:masterClrMapping/>
+  </p:clrMapOvr>
+</p:sld>
+</file>
+
+<file path=ppt/slides/slide11.xml><?xml version="1.0" encoding="utf-8"?>
+<p:sld xmlns:a="http://schemas.openxmlformats.org/drawingml/2006/main" xmlns:r="http://schemas.openxmlformats.org/officeDocument/2006/relationships" xmlns:p="http://schemas.openxmlformats.org/presentationml/2006/main">
+  <p:cSld>
+    <p:spTree>
+      <p:nvGrpSpPr>
+        <p:cNvPr id="1" name=""/>
+        <p:cNvGrpSpPr/>
+        <p:nvPr/>
+      </p:nvGrpSpPr>
+      <p:grpSpPr>
+        <a:xfrm>
+          <a:off x="0" y="0"/>
+          <a:ext cx="0" cy="0"/>
+          <a:chOff x="0" y="0"/>
+          <a:chExt cx="0" cy="0"/>
+        </a:xfrm>
+      </p:grpSpPr>
+      <p:sp>
+        <p:nvSpPr>
+          <p:cNvPr id="4" name="Título 1">
+            <a:extLst>
+              <a:ext uri="{FF2B5EF4-FFF2-40B4-BE49-F238E27FC236}">
+                <a16:creationId xmlns:a16="http://schemas.microsoft.com/office/drawing/2014/main" id="{3A3D9157-7421-4A82-89D4-9890C1605A93}"/>
+              </a:ext>
+            </a:extLst>
+          </p:cNvPr>
+          <p:cNvSpPr txBox="1">
+            <a:spLocks/>
+          </p:cNvSpPr>
+          <p:nvPr/>
+        </p:nvSpPr>
+        <p:spPr>
+          <a:xfrm>
+            <a:off x="3341138" y="279399"/>
+            <a:ext cx="5509723" cy="469901"/>
+          </a:xfrm>
+          <a:prstGeom prst="rect">
+            <a:avLst/>
+          </a:prstGeom>
+        </p:spPr>
+        <p:txBody>
+          <a:bodyPr vert="horz" lIns="91440" tIns="45720" rIns="91440" bIns="45720" rtlCol="0" anchor="t">
+            <a:normAutofit fontScale="75000" lnSpcReduction="20000"/>
+          </a:bodyPr>
+          <a:lstStyle>
+            <a:lvl1pPr algn="r" defTabSz="914400" rtl="0" eaLnBrk="1" latinLnBrk="0" hangingPunct="1">
+              <a:lnSpc>
+                <a:spcPct val="90000"/>
+              </a:lnSpc>
+              <a:spcBef>
+                <a:spcPct val="0"/>
+              </a:spcBef>
+              <a:buNone/>
+              <a:defRPr sz="3400" b="0" i="0" kern="1200" cap="none">
+                <a:solidFill>
+                  <a:schemeClr val="tx1"/>
+                </a:solidFill>
+                <a:effectLst/>
+                <a:latin typeface="+mj-lt"/>
+                <a:ea typeface="+mj-ea"/>
+                <a:cs typeface="+mj-cs"/>
+              </a:defRPr>
+            </a:lvl1pPr>
+          </a:lstStyle>
+          <a:p>
+            <a:pPr algn="ctr"/>
+            <a:r>
+              <a:rPr lang="es-ES" b="1" dirty="0"/>
+              <a:t>PILOTAGE DE BARRE FRANCHE</a:t>
+            </a:r>
+          </a:p>
+        </p:txBody>
+      </p:sp>
+      <p:pic>
+        <p:nvPicPr>
+          <p:cNvPr id="7" name="Imagen 6">
+            <a:extLst>
+              <a:ext uri="{FF2B5EF4-FFF2-40B4-BE49-F238E27FC236}">
+                <a16:creationId xmlns:a16="http://schemas.microsoft.com/office/drawing/2014/main" id="{A4CB7105-BD82-410E-BA1B-EAA19828B130}"/>
+              </a:ext>
+            </a:extLst>
+          </p:cNvPr>
+          <p:cNvPicPr>
+            <a:picLocks noChangeAspect="1"/>
+          </p:cNvPicPr>
+          <p:nvPr/>
+        </p:nvPicPr>
+        <p:blipFill rotWithShape="1">
+          <a:blip r:embed="rId2"/>
+          <a:srcRect l="239" r="921"/>
+          <a:stretch/>
+        </p:blipFill>
+        <p:spPr>
+          <a:xfrm>
+            <a:off x="1321764" y="1159278"/>
+            <a:ext cx="9548472" cy="4733521"/>
+          </a:xfrm>
+          <a:prstGeom prst="rect">
+            <a:avLst/>
+          </a:prstGeom>
+        </p:spPr>
+      </p:pic>
+    </p:spTree>
+    <p:extLst>
+      <p:ext uri="{BB962C8B-B14F-4D97-AF65-F5344CB8AC3E}">
+        <p14:creationId xmlns:p14="http://schemas.microsoft.com/office/powerpoint/2010/main" val="3129468092"/>
+      </p:ext>
+    </p:extLst>
+  </p:cSld>
+  <p:clrMapOvr>
+    <a:masterClrMapping/>
+  </p:clrMapOvr>
+</p:sld>
+</file>
+
 <file path=ppt/slides/slide2.xml><?xml version="1.0" encoding="utf-8"?>
 <p:sld xmlns:a="http://schemas.openxmlformats.org/drawingml/2006/main" xmlns:r="http://schemas.openxmlformats.org/officeDocument/2006/relationships" xmlns:p="http://schemas.openxmlformats.org/presentationml/2006/main">
   <p:cSld>
@@ -6022,66 +6532,10 @@
       </p:grpSpPr>
       <p:sp>
         <p:nvSpPr>
-          <p:cNvPr id="4" name="Título 1">
+          <p:cNvPr id="4" name="CuadroTexto 3">
             <a:extLst>
               <a:ext uri="{FF2B5EF4-FFF2-40B4-BE49-F238E27FC236}">
-                <a16:creationId xmlns:a16="http://schemas.microsoft.com/office/drawing/2014/main" id="{585AD0D3-6A3C-4BF9-AF7B-CA29E6B2DED2}"/>
-              </a:ext>
-            </a:extLst>
-          </p:cNvPr>
-          <p:cNvSpPr txBox="1">
-            <a:spLocks/>
-          </p:cNvSpPr>
-          <p:nvPr/>
-        </p:nvSpPr>
-        <p:spPr>
-          <a:xfrm>
-            <a:off x="4157054" y="134957"/>
-            <a:ext cx="3877892" cy="550844"/>
-          </a:xfrm>
-          <a:prstGeom prst="rect">
-            <a:avLst/>
-          </a:prstGeom>
-        </p:spPr>
-        <p:txBody>
-          <a:bodyPr vert="horz" lIns="91440" tIns="45720" rIns="91440" bIns="45720" rtlCol="0" anchor="t">
-            <a:normAutofit fontScale="90000"/>
-          </a:bodyPr>
-          <a:lstStyle>
-            <a:lvl1pPr algn="r" defTabSz="914400" rtl="0" eaLnBrk="1" latinLnBrk="0" hangingPunct="1">
-              <a:lnSpc>
-                <a:spcPct val="90000"/>
-              </a:lnSpc>
-              <a:spcBef>
-                <a:spcPct val="0"/>
-              </a:spcBef>
-              <a:buNone/>
-              <a:defRPr sz="3400" b="0" i="0" kern="1200" cap="none">
-                <a:solidFill>
-                  <a:schemeClr val="tx1"/>
-                </a:solidFill>
-                <a:effectLst/>
-                <a:latin typeface="+mj-lt"/>
-                <a:ea typeface="+mj-ea"/>
-                <a:cs typeface="+mj-cs"/>
-              </a:defRPr>
-            </a:lvl1pPr>
-          </a:lstStyle>
-          <a:p>
-            <a:pPr algn="ctr"/>
-            <a:r>
-              <a:rPr lang="es-ES" b="1" dirty="0"/>
-              <a:t>GESTION DE SOPC</a:t>
-            </a:r>
-          </a:p>
-        </p:txBody>
-      </p:sp>
-      <p:sp>
-        <p:nvSpPr>
-          <p:cNvPr id="5" name="CuadroTexto 4">
-            <a:extLst>
-              <a:ext uri="{FF2B5EF4-FFF2-40B4-BE49-F238E27FC236}">
-                <a16:creationId xmlns:a16="http://schemas.microsoft.com/office/drawing/2014/main" id="{6E315DB0-FB58-4DEA-B041-55D3D36CE296}"/>
+                <a16:creationId xmlns:a16="http://schemas.microsoft.com/office/drawing/2014/main" id="{C539FEEA-FB81-43C2-864C-50EB4B1422E1}"/>
               </a:ext>
             </a:extLst>
           </p:cNvPr>
@@ -6090,8 +6544,8 @@
         </p:nvSpPr>
         <p:spPr>
           <a:xfrm>
-            <a:off x="1104900" y="2551837"/>
-            <a:ext cx="4622800" cy="1754326"/>
+            <a:off x="1219201" y="228600"/>
+            <a:ext cx="9956800" cy="646331"/>
           </a:xfrm>
           <a:prstGeom prst="rect">
             <a:avLst/>
@@ -6104,34 +6558,69 @@
           </a:bodyPr>
           <a:lstStyle/>
           <a:p>
-            <a:pPr algn="just"/>
-            <a:r>
-              <a:rPr lang="es-ES" dirty="0" err="1"/>
-              <a:t>Pour</a:t>
+            <a:r>
+              <a:rPr lang="es-ES" dirty="0"/>
+              <a:t>Le </a:t>
+            </a:r>
+            <a:r>
+              <a:rPr lang="es-ES" dirty="0" err="1"/>
+              <a:t>schéma</a:t>
             </a:r>
             <a:r>
               <a:rPr lang="es-ES" dirty="0"/>
               <a:t> </a:t>
             </a:r>
             <a:r>
-              <a:rPr lang="fr-FR" dirty="0"/>
-              <a:t>implémenter</a:t>
-            </a:r>
-            <a:r>
-              <a:rPr lang="es-ES" dirty="0"/>
-              <a:t> les </a:t>
-            </a:r>
-            <a:r>
-              <a:rPr lang="es-ES" dirty="0" err="1"/>
-              <a:t>deux</a:t>
+              <a:rPr lang="es-ES" dirty="0" err="1"/>
+              <a:t>ci-dessous</a:t>
             </a:r>
             <a:r>
               <a:rPr lang="es-ES" dirty="0"/>
               <a:t> </a:t>
             </a:r>
             <a:r>
-              <a:rPr lang="fr-FR" dirty="0"/>
-              <a:t>fonctions</a:t>
+              <a:rPr lang="es-ES" dirty="0" err="1"/>
+              <a:t>représente</a:t>
+            </a:r>
+            <a:r>
+              <a:rPr lang="es-ES" dirty="0"/>
+              <a:t> le </a:t>
+            </a:r>
+            <a:r>
+              <a:rPr lang="es-ES" dirty="0" err="1"/>
+              <a:t>schéma</a:t>
+            </a:r>
+            <a:r>
+              <a:rPr lang="es-ES" dirty="0"/>
+              <a:t> de </a:t>
+            </a:r>
+            <a:r>
+              <a:rPr lang="es-ES" dirty="0" err="1"/>
+              <a:t>Quartus</a:t>
+            </a:r>
+            <a:r>
+              <a:rPr lang="es-ES" dirty="0"/>
+              <a:t> de la </a:t>
+            </a:r>
+            <a:r>
+              <a:rPr lang="es-ES" dirty="0" err="1"/>
+              <a:t>fonction</a:t>
+            </a:r>
+            <a:r>
+              <a:rPr lang="es-ES" dirty="0"/>
+              <a:t> de compas qui </a:t>
+            </a:r>
+            <a:r>
+              <a:rPr lang="es-ES" dirty="0" err="1"/>
+              <a:t>genère</a:t>
+            </a:r>
+            <a:r>
+              <a:rPr lang="es-ES" dirty="0"/>
+              <a:t> le </a:t>
+            </a:r>
+            <a:r>
+              <a:rPr lang="es-ES" dirty="0" err="1"/>
+              <a:t>degré</a:t>
             </a:r>
             <a:r>
               <a:rPr lang="es-ES" dirty="0"/>
@@ -6139,39 +6628,7 @@
             </a:r>
             <a:r>
               <a:rPr lang="es-ES" dirty="0" err="1"/>
-              <a:t>qu’on</a:t>
-            </a:r>
-            <a:r>
-              <a:rPr lang="es-ES" dirty="0"/>
-              <a:t> a </a:t>
-            </a:r>
-            <a:r>
-              <a:rPr lang="es-ES" dirty="0" err="1"/>
-              <a:t>réalisé</a:t>
-            </a:r>
-            <a:r>
-              <a:rPr lang="es-ES" dirty="0"/>
-              <a:t>, </a:t>
-            </a:r>
-            <a:r>
-              <a:rPr lang="es-ES" dirty="0" err="1"/>
-              <a:t>celui</a:t>
-            </a:r>
-            <a:r>
-              <a:rPr lang="es-ES" dirty="0"/>
-              <a:t> de compas et de </a:t>
-            </a:r>
-            <a:r>
-              <a:rPr lang="es-ES" dirty="0" err="1"/>
-              <a:t>l’anémomètre</a:t>
-            </a:r>
-            <a:r>
-              <a:rPr lang="es-ES" dirty="0"/>
-              <a:t>, </a:t>
-            </a:r>
-            <a:r>
-              <a:rPr lang="es-ES" dirty="0" err="1"/>
-              <a:t>il</a:t>
+              <a:t>désiré</a:t>
             </a:r>
             <a:r>
               <a:rPr lang="es-ES" dirty="0"/>
@@ -6179,7 +6636,7 @@
             </a:r>
             <a:r>
               <a:rPr lang="es-ES" dirty="0" err="1"/>
-              <a:t>nous</a:t>
+              <a:t>d’après</a:t>
             </a:r>
             <a:r>
               <a:rPr lang="es-ES" dirty="0"/>
@@ -6187,129 +6644,71 @@
             </a:r>
             <a:r>
               <a:rPr lang="es-ES" dirty="0" err="1"/>
-              <a:t>faut</a:t>
-            </a:r>
-            <a:r>
-              <a:rPr lang="es-ES" dirty="0"/>
-              <a:t> les </a:t>
-            </a:r>
-            <a:r>
-              <a:rPr lang="es-ES" dirty="0" err="1"/>
-              <a:t>introduire</a:t>
-            </a:r>
-            <a:r>
-              <a:rPr lang="es-ES" dirty="0"/>
-              <a:t> sur un </a:t>
-            </a:r>
-            <a:r>
-              <a:rPr lang="es-ES" dirty="0" err="1"/>
-              <a:t>réseau</a:t>
-            </a:r>
-            <a:r>
-              <a:rPr lang="es-ES" dirty="0"/>
-              <a:t> de BUS Avalon </a:t>
-            </a:r>
-            <a:r>
-              <a:rPr lang="es-ES" dirty="0" err="1"/>
-              <a:t>avec</a:t>
-            </a:r>
-            <a:r>
-              <a:rPr lang="es-ES" dirty="0"/>
-              <a:t> la </a:t>
-            </a:r>
-            <a:r>
-              <a:rPr lang="es-ES" dirty="0" err="1"/>
-              <a:t>fonction</a:t>
-            </a:r>
-            <a:r>
-              <a:rPr lang="es-ES" dirty="0"/>
-              <a:t> SOPC de PWM qui </a:t>
-            </a:r>
-            <a:r>
-              <a:rPr lang="es-ES" dirty="0" err="1"/>
-              <a:t>est</a:t>
-            </a:r>
-            <a:r>
-              <a:rPr lang="es-ES" dirty="0"/>
-              <a:t> </a:t>
-            </a:r>
-            <a:r>
-              <a:rPr lang="es-ES" dirty="0" err="1"/>
-              <a:t>déjà</a:t>
-            </a:r>
-            <a:r>
-              <a:rPr lang="es-ES" dirty="0"/>
-              <a:t> testé </a:t>
-            </a:r>
-            <a:r>
-              <a:rPr lang="es-ES" dirty="0" err="1"/>
-              <a:t>pour</a:t>
-            </a:r>
-            <a:r>
-              <a:rPr lang="es-ES" dirty="0"/>
-              <a:t> </a:t>
-            </a:r>
-            <a:r>
-              <a:rPr lang="es-ES" dirty="0" err="1"/>
-              <a:t>travailler</a:t>
-            </a:r>
-            <a:r>
-              <a:rPr lang="es-ES" dirty="0"/>
-              <a:t> </a:t>
-            </a:r>
-            <a:r>
-              <a:rPr lang="es-ES" dirty="0" err="1"/>
-              <a:t>avec</a:t>
-            </a:r>
-            <a:r>
-              <a:rPr lang="es-ES" dirty="0"/>
-              <a:t> sur </a:t>
-            </a:r>
-            <a:r>
-              <a:rPr lang="es-ES" dirty="0" err="1"/>
               <a:t>l’entrée</a:t>
             </a:r>
             <a:r>
               <a:rPr lang="es-ES" dirty="0"/>
-              <a:t> de compas :</a:t>
+              <a:t> de </a:t>
+            </a:r>
+            <a:r>
+              <a:rPr lang="es-ES" dirty="0" err="1"/>
+              <a:t>signal</a:t>
+            </a:r>
+            <a:r>
+              <a:rPr lang="es-ES" dirty="0"/>
+              <a:t> de PWM</a:t>
             </a:r>
           </a:p>
         </p:txBody>
       </p:sp>
       <p:pic>
         <p:nvPicPr>
-          <p:cNvPr id="9" name="Imagen 8">
+          <p:cNvPr id="6" name="Imagen 5">
             <a:extLst>
               <a:ext uri="{FF2B5EF4-FFF2-40B4-BE49-F238E27FC236}">
-                <a16:creationId xmlns:a16="http://schemas.microsoft.com/office/drawing/2014/main" id="{B2614D97-970F-4F47-8B6B-45B00E4CA8D1}"/>
+                <a16:creationId xmlns:a16="http://schemas.microsoft.com/office/drawing/2014/main" id="{11F8C0B7-A431-4C89-BD5D-923442841547}"/>
               </a:ext>
             </a:extLst>
           </p:cNvPr>
-          <p:cNvPicPr>
-            <a:picLocks noChangeAspect="1"/>
-          </p:cNvPicPr>
+          <p:cNvPicPr/>
           <p:nvPr/>
         </p:nvPicPr>
         <p:blipFill>
-          <a:blip r:embed="rId2"/>
+          <a:blip r:embed="rId2">
+            <a:extLst>
+              <a:ext uri="{28A0092B-C50C-407E-A947-70E740481C1C}">
+                <a14:useLocalDpi xmlns:a14="http://schemas.microsoft.com/office/drawing/2010/main" val="0"/>
+              </a:ext>
+            </a:extLst>
+          </a:blip>
           <a:stretch>
             <a:fillRect/>
           </a:stretch>
         </p:blipFill>
         <p:spPr>
           <a:xfrm>
-            <a:off x="5863462" y="685801"/>
-            <a:ext cx="5337938" cy="5877729"/>
+            <a:off x="1561727" y="1465590"/>
+            <a:ext cx="9000012" cy="4725485"/>
           </a:xfrm>
           <a:prstGeom prst="rect">
             <a:avLst/>
           </a:prstGeom>
+          <a:ln>
+            <a:noFill/>
+          </a:ln>
+          <a:effectLst>
+            <a:outerShdw blurRad="190500" algn="tl" rotWithShape="0">
+              <a:srgbClr val="000000">
+                <a:alpha val="70000"/>
+              </a:srgbClr>
+            </a:outerShdw>
+          </a:effectLst>
         </p:spPr>
       </p:pic>
     </p:spTree>
     <p:extLst>
       <p:ext uri="{BB962C8B-B14F-4D97-AF65-F5344CB8AC3E}">
-        <p14:creationId xmlns:p14="http://schemas.microsoft.com/office/powerpoint/2010/main" val="866911188"/>
+        <p14:creationId xmlns:p14="http://schemas.microsoft.com/office/powerpoint/2010/main" val="4201132809"/>
       </p:ext>
     </p:extLst>
   </p:cSld>
@@ -6338,66 +6737,10 @@
       </p:grpSpPr>
       <p:sp>
         <p:nvSpPr>
-          <p:cNvPr id="4" name="Título 1">
+          <p:cNvPr id="4" name="CuadroTexto 3">
             <a:extLst>
               <a:ext uri="{FF2B5EF4-FFF2-40B4-BE49-F238E27FC236}">
-                <a16:creationId xmlns:a16="http://schemas.microsoft.com/office/drawing/2014/main" id="{585AD0D3-6A3C-4BF9-AF7B-CA29E6B2DED2}"/>
-              </a:ext>
-            </a:extLst>
-          </p:cNvPr>
-          <p:cNvSpPr txBox="1">
-            <a:spLocks/>
-          </p:cNvSpPr>
-          <p:nvPr/>
-        </p:nvSpPr>
-        <p:spPr>
-          <a:xfrm>
-            <a:off x="4157054" y="134957"/>
-            <a:ext cx="3877892" cy="550844"/>
-          </a:xfrm>
-          <a:prstGeom prst="rect">
-            <a:avLst/>
-          </a:prstGeom>
-        </p:spPr>
-        <p:txBody>
-          <a:bodyPr vert="horz" lIns="91440" tIns="45720" rIns="91440" bIns="45720" rtlCol="0" anchor="t">
-            <a:normAutofit fontScale="82500" lnSpcReduction="10000"/>
-          </a:bodyPr>
-          <a:lstStyle>
-            <a:lvl1pPr algn="r" defTabSz="914400" rtl="0" eaLnBrk="1" latinLnBrk="0" hangingPunct="1">
-              <a:lnSpc>
-                <a:spcPct val="90000"/>
-              </a:lnSpc>
-              <a:spcBef>
-                <a:spcPct val="0"/>
-              </a:spcBef>
-              <a:buNone/>
-              <a:defRPr sz="3400" b="0" i="0" kern="1200" cap="none">
-                <a:solidFill>
-                  <a:schemeClr val="tx1"/>
-                </a:solidFill>
-                <a:effectLst/>
-                <a:latin typeface="+mj-lt"/>
-                <a:ea typeface="+mj-ea"/>
-                <a:cs typeface="+mj-cs"/>
-              </a:defRPr>
-            </a:lvl1pPr>
-          </a:lstStyle>
-          <a:p>
-            <a:pPr algn="ctr"/>
-            <a:r>
-              <a:rPr lang="es-ES" b="1" dirty="0"/>
-              <a:t>GESTION DE VERIN</a:t>
-            </a:r>
-          </a:p>
-        </p:txBody>
-      </p:sp>
-      <p:sp>
-        <p:nvSpPr>
-          <p:cNvPr id="5" name="CuadroTexto 4">
-            <a:extLst>
-              <a:ext uri="{FF2B5EF4-FFF2-40B4-BE49-F238E27FC236}">
-                <a16:creationId xmlns:a16="http://schemas.microsoft.com/office/drawing/2014/main" id="{6E315DB0-FB58-4DEA-B041-55D3D36CE296}"/>
+                <a16:creationId xmlns:a16="http://schemas.microsoft.com/office/drawing/2014/main" id="{C539FEEA-FB81-43C2-864C-50EB4B1422E1}"/>
               </a:ext>
             </a:extLst>
           </p:cNvPr>
@@ -6406,8 +6749,8 @@
         </p:nvSpPr>
         <p:spPr>
           <a:xfrm>
-            <a:off x="1079500" y="685801"/>
-            <a:ext cx="10134600" cy="923330"/>
+            <a:off x="1219201" y="228600"/>
+            <a:ext cx="9956800" cy="1200329"/>
           </a:xfrm>
           <a:prstGeom prst="rect">
             <a:avLst/>
@@ -6420,10 +6763,17 @@
           </a:bodyPr>
           <a:lstStyle/>
           <a:p>
-            <a:pPr algn="just"/>
-            <a:r>
-              <a:rPr lang="es-ES" dirty="0" err="1"/>
-              <a:t>Après</a:t>
+            <a:r>
+              <a:rPr lang="es-ES" dirty="0" err="1"/>
+              <a:t>Il</a:t>
+            </a:r>
+            <a:r>
+              <a:rPr lang="es-ES" dirty="0"/>
+              <a:t> y a </a:t>
+            </a:r>
+            <a:r>
+              <a:rPr lang="es-ES" dirty="0" err="1"/>
+              <a:t>plusieurs</a:t>
             </a:r>
             <a:r>
               <a:rPr lang="es-ES" dirty="0"/>
@@ -6431,23 +6781,7 @@
             </a:r>
             <a:r>
               <a:rPr lang="es-ES" dirty="0" err="1"/>
-              <a:t>tous</a:t>
-            </a:r>
-            <a:r>
-              <a:rPr lang="es-ES" dirty="0"/>
-              <a:t> ces </a:t>
-            </a:r>
-            <a:r>
-              <a:rPr lang="es-ES" dirty="0" err="1"/>
-              <a:t>étapes</a:t>
-            </a:r>
-            <a:r>
-              <a:rPr lang="es-ES" dirty="0"/>
-              <a:t> et </a:t>
-            </a:r>
-            <a:r>
-              <a:rPr lang="es-ES" dirty="0" err="1"/>
-              <a:t>qu’on</a:t>
+              <a:t>méthodes</a:t>
             </a:r>
             <a:r>
               <a:rPr lang="es-ES" dirty="0"/>
@@ -6455,249 +6789,196 @@
             </a:r>
             <a:r>
               <a:rPr lang="es-ES" dirty="0" err="1"/>
+              <a:t>pour</a:t>
+            </a:r>
+            <a:r>
+              <a:rPr lang="es-ES" dirty="0"/>
+              <a:t> </a:t>
+            </a:r>
+            <a:r>
+              <a:rPr lang="es-ES" dirty="0" err="1"/>
+              <a:t>tester</a:t>
+            </a:r>
+            <a:r>
+              <a:rPr lang="es-ES" dirty="0"/>
+              <a:t> la </a:t>
+            </a:r>
+            <a:r>
+              <a:rPr lang="es-ES" dirty="0" err="1"/>
+              <a:t>fonction</a:t>
+            </a:r>
+            <a:r>
+              <a:rPr lang="es-ES" dirty="0"/>
+              <a:t> que </a:t>
+            </a:r>
+            <a:r>
+              <a:rPr lang="es-ES" dirty="0" err="1"/>
+              <a:t>ça</a:t>
+            </a:r>
+            <a:r>
+              <a:rPr lang="es-ES" dirty="0"/>
+              <a:t> </a:t>
+            </a:r>
+            <a:r>
+              <a:rPr lang="es-ES" dirty="0" err="1"/>
+              <a:t>soit</a:t>
+            </a:r>
+            <a:r>
+              <a:rPr lang="es-ES" dirty="0"/>
+              <a:t> par un </a:t>
+            </a:r>
+            <a:r>
+              <a:rPr lang="es-ES" dirty="0" err="1"/>
+              <a:t>oscilloscope</a:t>
+            </a:r>
+            <a:r>
+              <a:rPr lang="es-ES" dirty="0"/>
+              <a:t>, par MODELSIM, </a:t>
+            </a:r>
+            <a:r>
+              <a:rPr lang="es-ES" dirty="0" err="1"/>
+              <a:t>ou</a:t>
+            </a:r>
+            <a:r>
+              <a:rPr lang="es-ES" dirty="0"/>
+              <a:t> par une </a:t>
+            </a:r>
+            <a:r>
+              <a:rPr lang="es-ES" dirty="0" err="1"/>
+              <a:t>méthode</a:t>
+            </a:r>
+            <a:r>
+              <a:rPr lang="es-ES" dirty="0"/>
+              <a:t> de </a:t>
+            </a:r>
+            <a:r>
+              <a:rPr lang="es-ES" dirty="0" err="1"/>
+              <a:t>Quartus</a:t>
+            </a:r>
+            <a:r>
+              <a:rPr lang="es-ES" dirty="0"/>
+              <a:t> qui </a:t>
+            </a:r>
+            <a:r>
+              <a:rPr lang="es-ES" dirty="0" err="1"/>
               <a:t>est</a:t>
             </a:r>
             <a:r>
               <a:rPr lang="es-ES" dirty="0"/>
-              <a:t> </a:t>
-            </a:r>
-            <a:r>
-              <a:rPr lang="es-ES" dirty="0" err="1"/>
-              <a:t>sûre</a:t>
-            </a:r>
-            <a:r>
-              <a:rPr lang="es-ES" dirty="0"/>
-              <a:t> que les </a:t>
-            </a:r>
-            <a:r>
-              <a:rPr lang="es-ES" dirty="0" err="1"/>
-              <a:t>fonctions</a:t>
-            </a:r>
-            <a:r>
-              <a:rPr lang="es-ES" dirty="0"/>
-              <a:t> </a:t>
-            </a:r>
-            <a:r>
-              <a:rPr lang="es-ES" dirty="0" err="1"/>
-              <a:t>marchent</a:t>
-            </a:r>
-            <a:r>
-              <a:rPr lang="es-ES" dirty="0"/>
-              <a:t> </a:t>
-            </a:r>
-            <a:r>
-              <a:rPr lang="es-ES" dirty="0" err="1"/>
-              <a:t>comme</a:t>
-            </a:r>
-            <a:r>
-              <a:rPr lang="es-ES" dirty="0"/>
-              <a:t> </a:t>
-            </a:r>
-            <a:r>
-              <a:rPr lang="es-ES" dirty="0" err="1"/>
-              <a:t>il</a:t>
-            </a:r>
-            <a:r>
-              <a:rPr lang="es-ES" dirty="0"/>
-              <a:t> </a:t>
-            </a:r>
-            <a:r>
-              <a:rPr lang="es-ES" dirty="0" err="1"/>
-              <a:t>faut</a:t>
-            </a:r>
-            <a:r>
-              <a:rPr lang="es-ES" dirty="0"/>
-              <a:t>, </a:t>
-            </a:r>
-            <a:r>
-              <a:rPr lang="es-ES" dirty="0" err="1"/>
-              <a:t>on</a:t>
-            </a:r>
-            <a:r>
-              <a:rPr lang="es-ES" dirty="0"/>
-              <a:t> </a:t>
-            </a:r>
-            <a:r>
-              <a:rPr lang="es-ES" dirty="0" err="1"/>
-              <a:t>passe</a:t>
-            </a:r>
-            <a:r>
-              <a:rPr lang="es-ES" dirty="0"/>
-              <a:t> </a:t>
-            </a:r>
-            <a:r>
-              <a:rPr lang="es-ES" dirty="0" err="1"/>
-              <a:t>au</a:t>
-            </a:r>
-            <a:r>
-              <a:rPr lang="es-ES" dirty="0"/>
-              <a:t> test </a:t>
-            </a:r>
-            <a:r>
-              <a:rPr lang="es-ES" dirty="0" err="1"/>
-              <a:t>réel</a:t>
-            </a:r>
-            <a:r>
-              <a:rPr lang="es-ES" dirty="0"/>
-              <a:t> de </a:t>
-            </a:r>
-            <a:r>
-              <a:rPr lang="es-ES" dirty="0" err="1"/>
-              <a:t>notre</a:t>
-            </a:r>
-            <a:r>
-              <a:rPr lang="es-ES" dirty="0"/>
-              <a:t> </a:t>
-            </a:r>
-            <a:r>
-              <a:rPr lang="es-ES" dirty="0" err="1"/>
-              <a:t>système</a:t>
-            </a:r>
-            <a:r>
-              <a:rPr lang="es-ES" dirty="0"/>
-              <a:t> en </a:t>
-            </a:r>
-            <a:r>
-              <a:rPr lang="es-ES" dirty="0" err="1"/>
-              <a:t>utilisant</a:t>
-            </a:r>
-            <a:r>
-              <a:rPr lang="es-ES" dirty="0"/>
               <a:t> le </a:t>
             </a:r>
             <a:r>
-              <a:rPr lang="es-ES" dirty="0" err="1"/>
-              <a:t>verin</a:t>
-            </a:r>
-            <a:r>
-              <a:rPr lang="es-ES" dirty="0"/>
-              <a:t> qui </a:t>
-            </a:r>
-            <a:r>
-              <a:rPr lang="es-ES" dirty="0" err="1"/>
-              <a:t>traduit</a:t>
-            </a:r>
-            <a:r>
-              <a:rPr lang="es-ES" dirty="0"/>
-              <a:t> le </a:t>
-            </a:r>
-            <a:r>
-              <a:rPr lang="es-ES" dirty="0" err="1"/>
-              <a:t>comportement</a:t>
-            </a:r>
-            <a:r>
-              <a:rPr lang="es-ES" dirty="0"/>
-              <a:t> de </a:t>
-            </a:r>
-            <a:r>
-              <a:rPr lang="es-ES" dirty="0" err="1"/>
-              <a:t>système</a:t>
-            </a:r>
-            <a:r>
-              <a:rPr lang="es-ES" dirty="0"/>
-              <a:t> de </a:t>
-            </a:r>
-            <a:r>
-              <a:rPr lang="es-ES" dirty="0" err="1"/>
-              <a:t>contrôle</a:t>
-            </a:r>
-            <a:r>
-              <a:rPr lang="es-ES" dirty="0"/>
-              <a:t> de </a:t>
-            </a:r>
-            <a:r>
-              <a:rPr lang="es-ES" dirty="0" err="1"/>
-              <a:t>voilier</a:t>
-            </a:r>
-            <a:r>
-              <a:rPr lang="es-ES" dirty="0"/>
-              <a:t> en </a:t>
-            </a:r>
-            <a:r>
-              <a:rPr lang="es-ES" dirty="0" err="1"/>
-              <a:t>fonction</a:t>
-            </a:r>
-            <a:r>
-              <a:rPr lang="es-ES" dirty="0"/>
-              <a:t> des </a:t>
-            </a:r>
-            <a:r>
-              <a:rPr lang="es-ES" dirty="0" err="1"/>
-              <a:t>données</a:t>
-            </a:r>
-            <a:r>
-              <a:rPr lang="es-ES" dirty="0"/>
-              <a:t> de compas et de </a:t>
-            </a:r>
-            <a:r>
-              <a:rPr lang="es-ES" dirty="0" err="1"/>
-              <a:t>l’anémomètre</a:t>
-            </a:r>
-            <a:r>
-              <a:rPr lang="es-ES" dirty="0"/>
-              <a:t> </a:t>
-            </a:r>
-            <a:r>
-              <a:rPr lang="es-ES" dirty="0" err="1"/>
-              <a:t>pour</a:t>
-            </a:r>
-            <a:r>
-              <a:rPr lang="es-ES" dirty="0"/>
-              <a:t> </a:t>
-            </a:r>
-            <a:r>
-              <a:rPr lang="es-ES" dirty="0" err="1"/>
-              <a:t>finaliser</a:t>
-            </a:r>
-            <a:r>
-              <a:rPr lang="es-ES" dirty="0"/>
-              <a:t> le </a:t>
-            </a:r>
-            <a:r>
-              <a:rPr lang="es-ES" dirty="0" err="1"/>
-              <a:t>projet</a:t>
-            </a:r>
-            <a:r>
-              <a:rPr lang="es-ES" dirty="0"/>
-              <a:t> :</a:t>
-            </a:r>
+              <a:rPr lang="fr-FR" sz="1800" b="1" dirty="0">
+                <a:effectLst/>
+                <a:latin typeface="Calibri" panose="020F0502020204030204" pitchFamily="34" charset="0"/>
+                <a:ea typeface="Calibri" panose="020F0502020204030204" pitchFamily="34" charset="0"/>
+                <a:cs typeface="Times New Roman" panose="02020603050405020304" pitchFamily="18" charset="0"/>
+              </a:rPr>
+              <a:t>Signal Tap Logic Analyser </a:t>
+            </a:r>
+            <a:r>
+              <a:rPr lang="fr-FR" sz="1800" dirty="0">
+                <a:effectLst/>
+                <a:latin typeface="Calibri" panose="020F0502020204030204" pitchFamily="34" charset="0"/>
+                <a:ea typeface="Calibri" panose="020F0502020204030204" pitchFamily="34" charset="0"/>
+                <a:cs typeface="Times New Roman" panose="02020603050405020304" pitchFamily="18" charset="0"/>
+              </a:rPr>
+              <a:t>où on  peut visualiser les signaux de système, dans notre cas c’est la trame de sortie </a:t>
+            </a:r>
+            <a:r>
+              <a:rPr lang="fr-FR" sz="1800" b="1" dirty="0">
+                <a:effectLst/>
+                <a:latin typeface="Calibri" panose="020F0502020204030204" pitchFamily="34" charset="0"/>
+                <a:ea typeface="Calibri" panose="020F0502020204030204" pitchFamily="34" charset="0"/>
+                <a:cs typeface="Times New Roman" panose="02020603050405020304" pitchFamily="18" charset="0"/>
+              </a:rPr>
+              <a:t>out_pwm </a:t>
+            </a:r>
+            <a:r>
+              <a:rPr lang="fr-FR" sz="1800" dirty="0">
+                <a:effectLst/>
+                <a:latin typeface="Calibri" panose="020F0502020204030204" pitchFamily="34" charset="0"/>
+                <a:ea typeface="Calibri" panose="020F0502020204030204" pitchFamily="34" charset="0"/>
+                <a:cs typeface="Times New Roman" panose="02020603050405020304" pitchFamily="18" charset="0"/>
+              </a:rPr>
+              <a:t>qui est dans ce test la valeur maximale de degré 360º :</a:t>
+            </a:r>
+            <a:endParaRPr lang="es-ES" dirty="0"/>
           </a:p>
         </p:txBody>
       </p:sp>
       <p:pic>
         <p:nvPicPr>
-          <p:cNvPr id="3" name="Imagen 2">
+          <p:cNvPr id="5" name="Imagen 4">
             <a:extLst>
               <a:ext uri="{FF2B5EF4-FFF2-40B4-BE49-F238E27FC236}">
-                <a16:creationId xmlns:a16="http://schemas.microsoft.com/office/drawing/2014/main" id="{2BECB17C-E274-4792-913D-CE07531607CE}"/>
+                <a16:creationId xmlns:a16="http://schemas.microsoft.com/office/drawing/2014/main" id="{C1147B39-E19E-43D7-9FE9-4E3B4EFEF424}"/>
               </a:ext>
             </a:extLst>
           </p:cNvPr>
-          <p:cNvPicPr>
-            <a:picLocks noChangeAspect="1"/>
-          </p:cNvPicPr>
+          <p:cNvPicPr/>
           <p:nvPr/>
         </p:nvPicPr>
-        <p:blipFill>
-          <a:blip r:embed="rId2"/>
-          <a:stretch>
-            <a:fillRect/>
-          </a:stretch>
+        <p:blipFill rotWithShape="1">
+          <a:blip r:embed="rId2">
+            <a:extLst>
+              <a:ext uri="{28A0092B-C50C-407E-A947-70E740481C1C}">
+                <a14:useLocalDpi xmlns:a14="http://schemas.microsoft.com/office/drawing/2010/main" val="0"/>
+              </a:ext>
+            </a:extLst>
+          </a:blip>
+          <a:srcRect r="21162"/>
+          <a:stretch/>
         </p:blipFill>
-        <p:spPr>
-          <a:xfrm>
-            <a:off x="1709737" y="1741487"/>
-            <a:ext cx="8772525" cy="4848225"/>
+        <p:spPr bwMode="auto">
+          <a:xfrm>
+            <a:off x="1219201" y="1808480"/>
+            <a:ext cx="9283816" cy="4558764"/>
           </a:xfrm>
           <a:prstGeom prst="rect">
             <a:avLst/>
           </a:prstGeom>
+          <a:solidFill>
+            <a:srgbClr val="FFFFFF">
+              <a:shade val="85000"/>
+            </a:srgbClr>
+          </a:solidFill>
+          <a:ln w="190500" cap="sq">
+            <a:solidFill>
+              <a:srgbClr val="FFFFFF"/>
+            </a:solidFill>
+            <a:miter lim="800000"/>
+          </a:ln>
+          <a:effectLst>
+            <a:outerShdw blurRad="55000" dist="18000" dir="5400000" algn="tl" rotWithShape="0">
+              <a:srgbClr val="000000">
+                <a:alpha val="40000"/>
+              </a:srgbClr>
+            </a:outerShdw>
+          </a:effectLst>
+          <a:scene3d>
+            <a:camera prst="orthographicFront"/>
+            <a:lightRig rig="twoPt" dir="t">
+              <a:rot lat="0" lon="0" rev="7200000"/>
+            </a:lightRig>
+          </a:scene3d>
+          <a:sp3d>
+            <a:bevelT w="25400" h="19050"/>
+            <a:contourClr>
+              <a:srgbClr val="FFFFFF"/>
+            </a:contourClr>
+          </a:sp3d>
+          <a:extLst>
+            <a:ext uri="{53640926-AAD7-44D8-BBD7-CCE9431645EC}">
+              <a14:shadowObscured xmlns:a14="http://schemas.microsoft.com/office/drawing/2010/main"/>
+            </a:ext>
+          </a:extLst>
         </p:spPr>
       </p:pic>
     </p:spTree>
     <p:extLst>
       <p:ext uri="{BB962C8B-B14F-4D97-AF65-F5344CB8AC3E}">
-        <p14:creationId xmlns:p14="http://schemas.microsoft.com/office/powerpoint/2010/main" val="2110897045"/>
+        <p14:creationId xmlns:p14="http://schemas.microsoft.com/office/powerpoint/2010/main" val="3513874866"/>
       </p:ext>
     </p:extLst>
   </p:cSld>
@@ -6729,7 +7010,7 @@
           <p:cNvPr id="4" name="Título 1">
             <a:extLst>
               <a:ext uri="{FF2B5EF4-FFF2-40B4-BE49-F238E27FC236}">
-                <a16:creationId xmlns:a16="http://schemas.microsoft.com/office/drawing/2014/main" id="{3A3D9157-7421-4A82-89D4-9890C1605A93}"/>
+                <a16:creationId xmlns:a16="http://schemas.microsoft.com/office/drawing/2014/main" id="{585AD0D3-6A3C-4BF9-AF7B-CA29E6B2DED2}"/>
               </a:ext>
             </a:extLst>
           </p:cNvPr>
@@ -6740,8 +7021,8 @@
         </p:nvSpPr>
         <p:spPr>
           <a:xfrm>
-            <a:off x="3341138" y="279399"/>
-            <a:ext cx="5509723" cy="469901"/>
+            <a:off x="4157054" y="134957"/>
+            <a:ext cx="3877892" cy="550844"/>
           </a:xfrm>
           <a:prstGeom prst="rect">
             <a:avLst/>
@@ -6749,7 +7030,7 @@
         </p:spPr>
         <p:txBody>
           <a:bodyPr vert="horz" lIns="91440" tIns="45720" rIns="91440" bIns="45720" rtlCol="0" anchor="t">
-            <a:normAutofit fontScale="75000" lnSpcReduction="20000"/>
+            <a:normAutofit fontScale="90000"/>
           </a:bodyPr>
           <a:lstStyle>
             <a:lvl1pPr algn="r" defTabSz="914400" rtl="0" eaLnBrk="1" latinLnBrk="0" hangingPunct="1">
@@ -6775,17 +7056,217 @@
             <a:pPr algn="ctr"/>
             <a:r>
               <a:rPr lang="es-ES" b="1" dirty="0"/>
-              <a:t>PILOTAGE DE BARRE FRANCHE</a:t>
+              <a:t>GESTION DE SOPC</a:t>
+            </a:r>
+          </a:p>
+        </p:txBody>
+      </p:sp>
+      <p:sp>
+        <p:nvSpPr>
+          <p:cNvPr id="5" name="CuadroTexto 4">
+            <a:extLst>
+              <a:ext uri="{FF2B5EF4-FFF2-40B4-BE49-F238E27FC236}">
+                <a16:creationId xmlns:a16="http://schemas.microsoft.com/office/drawing/2014/main" id="{6E315DB0-FB58-4DEA-B041-55D3D36CE296}"/>
+              </a:ext>
+            </a:extLst>
+          </p:cNvPr>
+          <p:cNvSpPr txBox="1"/>
+          <p:nvPr/>
+        </p:nvSpPr>
+        <p:spPr>
+          <a:xfrm>
+            <a:off x="1104900" y="2551837"/>
+            <a:ext cx="4622800" cy="1754326"/>
+          </a:xfrm>
+          <a:prstGeom prst="rect">
+            <a:avLst/>
+          </a:prstGeom>
+          <a:noFill/>
+        </p:spPr>
+        <p:txBody>
+          <a:bodyPr wrap="square" rtlCol="0">
+            <a:spAutoFit/>
+          </a:bodyPr>
+          <a:lstStyle/>
+          <a:p>
+            <a:pPr algn="just"/>
+            <a:r>
+              <a:rPr lang="es-ES" dirty="0" err="1"/>
+              <a:t>Pour</a:t>
+            </a:r>
+            <a:r>
+              <a:rPr lang="es-ES" dirty="0"/>
+              <a:t> </a:t>
+            </a:r>
+            <a:r>
+              <a:rPr lang="fr-FR" dirty="0"/>
+              <a:t>implémenter</a:t>
+            </a:r>
+            <a:r>
+              <a:rPr lang="es-ES" dirty="0"/>
+              <a:t> les </a:t>
+            </a:r>
+            <a:r>
+              <a:rPr lang="es-ES" dirty="0" err="1"/>
+              <a:t>deux</a:t>
+            </a:r>
+            <a:r>
+              <a:rPr lang="es-ES" dirty="0"/>
+              <a:t> </a:t>
+            </a:r>
+            <a:r>
+              <a:rPr lang="fr-FR" dirty="0"/>
+              <a:t>fonctions</a:t>
+            </a:r>
+            <a:r>
+              <a:rPr lang="es-ES" dirty="0"/>
+              <a:t> </a:t>
+            </a:r>
+            <a:r>
+              <a:rPr lang="es-ES" dirty="0" err="1"/>
+              <a:t>qu’on</a:t>
+            </a:r>
+            <a:r>
+              <a:rPr lang="es-ES" dirty="0"/>
+              <a:t> a </a:t>
+            </a:r>
+            <a:r>
+              <a:rPr lang="es-ES" dirty="0" err="1"/>
+              <a:t>réalisé</a:t>
+            </a:r>
+            <a:r>
+              <a:rPr lang="es-ES" dirty="0"/>
+              <a:t>, </a:t>
+            </a:r>
+            <a:r>
+              <a:rPr lang="es-ES" dirty="0" err="1"/>
+              <a:t>celui</a:t>
+            </a:r>
+            <a:r>
+              <a:rPr lang="es-ES" dirty="0"/>
+              <a:t> de compas et de </a:t>
+            </a:r>
+            <a:r>
+              <a:rPr lang="es-ES" dirty="0" err="1"/>
+              <a:t>l’anémomètre</a:t>
+            </a:r>
+            <a:r>
+              <a:rPr lang="es-ES" dirty="0"/>
+              <a:t>, </a:t>
+            </a:r>
+            <a:r>
+              <a:rPr lang="es-ES" dirty="0" err="1"/>
+              <a:t>il</a:t>
+            </a:r>
+            <a:r>
+              <a:rPr lang="es-ES" dirty="0"/>
+              <a:t> </a:t>
+            </a:r>
+            <a:r>
+              <a:rPr lang="es-ES" dirty="0" err="1"/>
+              <a:t>nous</a:t>
+            </a:r>
+            <a:r>
+              <a:rPr lang="es-ES" dirty="0"/>
+              <a:t> </a:t>
+            </a:r>
+            <a:r>
+              <a:rPr lang="es-ES" dirty="0" err="1"/>
+              <a:t>faut</a:t>
+            </a:r>
+            <a:r>
+              <a:rPr lang="es-ES" dirty="0"/>
+              <a:t> les </a:t>
+            </a:r>
+            <a:r>
+              <a:rPr lang="es-ES" dirty="0" err="1"/>
+              <a:t>introduire</a:t>
+            </a:r>
+            <a:r>
+              <a:rPr lang="es-ES" dirty="0"/>
+              <a:t> sur un </a:t>
+            </a:r>
+            <a:r>
+              <a:rPr lang="es-ES" dirty="0" err="1"/>
+              <a:t>réseau</a:t>
+            </a:r>
+            <a:r>
+              <a:rPr lang="es-ES" dirty="0"/>
+              <a:t> de BUS Avalon </a:t>
+            </a:r>
+            <a:r>
+              <a:rPr lang="es-ES" dirty="0" err="1"/>
+              <a:t>avec</a:t>
+            </a:r>
+            <a:r>
+              <a:rPr lang="es-ES" dirty="0"/>
+              <a:t> la </a:t>
+            </a:r>
+            <a:r>
+              <a:rPr lang="es-ES" dirty="0" err="1"/>
+              <a:t>fonction</a:t>
+            </a:r>
+            <a:r>
+              <a:rPr lang="es-ES" dirty="0"/>
+              <a:t> SOPC de PWM qui </a:t>
+            </a:r>
+            <a:r>
+              <a:rPr lang="es-ES" dirty="0" err="1"/>
+              <a:t>est</a:t>
+            </a:r>
+            <a:r>
+              <a:rPr lang="es-ES" dirty="0"/>
+              <a:t> </a:t>
+            </a:r>
+            <a:r>
+              <a:rPr lang="es-ES" dirty="0" err="1"/>
+              <a:t>déjà</a:t>
+            </a:r>
+            <a:r>
+              <a:rPr lang="es-ES" dirty="0"/>
+              <a:t> testé </a:t>
+            </a:r>
+            <a:r>
+              <a:rPr lang="es-ES" dirty="0" err="1"/>
+              <a:t>pour</a:t>
+            </a:r>
+            <a:r>
+              <a:rPr lang="es-ES" dirty="0"/>
+              <a:t> </a:t>
+            </a:r>
+            <a:r>
+              <a:rPr lang="es-ES" dirty="0" err="1"/>
+              <a:t>travailler</a:t>
+            </a:r>
+            <a:r>
+              <a:rPr lang="es-ES" dirty="0"/>
+              <a:t> </a:t>
+            </a:r>
+            <a:r>
+              <a:rPr lang="es-ES" dirty="0" err="1"/>
+              <a:t>avec</a:t>
+            </a:r>
+            <a:r>
+              <a:rPr lang="es-ES" dirty="0"/>
+              <a:t> sur </a:t>
+            </a:r>
+            <a:r>
+              <a:rPr lang="es-ES" dirty="0" err="1"/>
+              <a:t>l’entrée</a:t>
+            </a:r>
+            <a:r>
+              <a:rPr lang="es-ES" dirty="0"/>
+              <a:t> de compas :</a:t>
             </a:r>
           </a:p>
         </p:txBody>
       </p:sp>
       <p:pic>
         <p:nvPicPr>
-          <p:cNvPr id="7" name="Imagen 6">
+          <p:cNvPr id="9" name="Imagen 8">
             <a:extLst>
               <a:ext uri="{FF2B5EF4-FFF2-40B4-BE49-F238E27FC236}">
-                <a16:creationId xmlns:a16="http://schemas.microsoft.com/office/drawing/2014/main" id="{A4CB7105-BD82-410E-BA1B-EAA19828B130}"/>
+                <a16:creationId xmlns:a16="http://schemas.microsoft.com/office/drawing/2014/main" id="{B2614D97-970F-4F47-8B6B-45B00E4CA8D1}"/>
               </a:ext>
             </a:extLst>
           </p:cNvPr>
@@ -6794,15 +7275,16 @@
           </p:cNvPicPr>
           <p:nvPr/>
         </p:nvPicPr>
-        <p:blipFill rotWithShape="1">
+        <p:blipFill>
           <a:blip r:embed="rId2"/>
-          <a:srcRect l="239" r="921"/>
-          <a:stretch/>
+          <a:stretch>
+            <a:fillRect/>
+          </a:stretch>
         </p:blipFill>
         <p:spPr>
           <a:xfrm>
-            <a:off x="1321764" y="1159278"/>
-            <a:ext cx="9548472" cy="4733521"/>
+            <a:off x="5863462" y="685801"/>
+            <a:ext cx="5337938" cy="5877729"/>
           </a:xfrm>
           <a:prstGeom prst="rect">
             <a:avLst/>
@@ -6812,7 +7294,7 @@
     </p:spTree>
     <p:extLst>
       <p:ext uri="{BB962C8B-B14F-4D97-AF65-F5344CB8AC3E}">
-        <p14:creationId xmlns:p14="http://schemas.microsoft.com/office/powerpoint/2010/main" val="3129468092"/>
+        <p14:creationId xmlns:p14="http://schemas.microsoft.com/office/powerpoint/2010/main" val="866911188"/>
       </p:ext>
     </p:extLst>
   </p:cSld>

</xml_diff>